<commit_message>
Notas de la reunión 08/09/18 para la presentación
</commit_message>
<xml_diff>
--- a/Trabajo/Presentación/Desarrollo de software basado en microservicios.pptx
+++ b/Trabajo/Presentación/Desarrollo de software basado en microservicios.pptx
@@ -8012,8 +8012,8 @@
         </p:nvSpPr>
         <p:spPr>
           <a:xfrm>
-            <a:off x="643467" y="2587244"/>
-            <a:ext cx="3522132" cy="3419856"/>
+            <a:off x="419100" y="2587244"/>
+            <a:ext cx="3746499" cy="3419856"/>
           </a:xfrm>
         </p:spPr>
         <p:txBody>
@@ -8028,15 +8028,20 @@
                   <a:schemeClr val="bg1"/>
                 </a:solidFill>
               </a:rPr>
-              <a:t>Máquinas virtuales</a:t>
-            </a:r>
+              <a:t>Máquinas virtuales:</a:t>
+            </a:r>
+          </a:p>
+          <a:p>
+            <a:pPr marL="0" indent="0">
+              <a:buNone/>
+            </a:pPr>
             <a:r>
               <a:rPr lang="es-ES" sz="2400" dirty="0">
                 <a:solidFill>
                   <a:schemeClr val="bg1"/>
                 </a:solidFill>
               </a:rPr>
-              <a:t>: mayor tiempo de despliegue y consumo de recursos.</a:t>
+              <a:t>Mayor tiempo de despliegue y consumo de recursos.</a:t>
             </a:r>
           </a:p>
           <a:p>
@@ -8061,7 +8066,20 @@
                   <a:schemeClr val="bg1"/>
                 </a:solidFill>
               </a:rPr>
-              <a:t>: más ligeros pero menor grado de aislamiento.</a:t>
+              <a:t>: </a:t>
+            </a:r>
+          </a:p>
+          <a:p>
+            <a:pPr marL="0" indent="0">
+              <a:buNone/>
+            </a:pPr>
+            <a:r>
+              <a:rPr lang="es-ES" sz="2400" dirty="0">
+                <a:solidFill>
+                  <a:schemeClr val="bg1"/>
+                </a:solidFill>
+              </a:rPr>
+              <a:t>Más ligeros pero menor grado de aislamiento.</a:t>
             </a:r>
           </a:p>
         </p:txBody>
@@ -8111,45 +8129,6 @@
           </a:prstGeom>
         </p:spPr>
       </p:pic>
-      <p:cxnSp>
-        <p:nvCxnSpPr>
-          <p:cNvPr id="6" name="Conector recto de flecha 5">
-            <a:extLst>
-              <a:ext uri="{FF2B5EF4-FFF2-40B4-BE49-F238E27FC236}">
-                <a16:creationId xmlns:a16="http://schemas.microsoft.com/office/drawing/2014/main" id="{2EC7083E-A3D6-452B-A3C8-0A6B5B5356F2}"/>
-              </a:ext>
-            </a:extLst>
-          </p:cNvPr>
-          <p:cNvCxnSpPr/>
-          <p:nvPr/>
-        </p:nvCxnSpPr>
-        <p:spPr>
-          <a:xfrm flipH="1">
-            <a:off x="8928100" y="4838700"/>
-            <a:ext cx="165100" cy="0"/>
-          </a:xfrm>
-          <a:prstGeom prst="straightConnector1">
-            <a:avLst/>
-          </a:prstGeom>
-          <a:ln>
-            <a:tailEnd type="triangle"/>
-          </a:ln>
-        </p:spPr>
-        <p:style>
-          <a:lnRef idx="1">
-            <a:schemeClr val="accent1"/>
-          </a:lnRef>
-          <a:fillRef idx="0">
-            <a:schemeClr val="accent1"/>
-          </a:fillRef>
-          <a:effectRef idx="0">
-            <a:schemeClr val="accent1"/>
-          </a:effectRef>
-          <a:fontRef idx="minor">
-            <a:schemeClr val="tx1"/>
-          </a:fontRef>
-        </p:style>
-      </p:cxnSp>
     </p:spTree>
     <p:extLst>
       <p:ext uri="{BB962C8B-B14F-4D97-AF65-F5344CB8AC3E}">
@@ -8293,7 +8272,7 @@
             </a:r>
             <a:r>
               <a:rPr lang="es-ES" sz="2400" b="1" i="1" dirty="0"/>
-              <a:t>”</a:t>
+              <a:t>” - Amazon</a:t>
             </a:r>
           </a:p>
           <a:p>
@@ -9399,7 +9378,7 @@
         </p:blipFill>
         <p:spPr>
           <a:xfrm>
-            <a:off x="9082576" y="2748705"/>
+            <a:off x="9292437" y="2748704"/>
             <a:ext cx="1592886" cy="1360590"/>
           </a:xfrm>
           <a:prstGeom prst="rect">

</xml_diff>